<commit_message>
Update demo documentation and remove outdated skill installation command
- Revised the `demo.md` file to remove the outdated skill installation command for the Avax-like frontend design, streamlining the instructions for users.
- Updated the PowerPoint presentation file for the Avalanche + AI hands-on demo to reflect the latest changes.
</commit_message>
<xml_diff>
--- a/docs/hands-on/avalanche-ai-handson-demo.pptx
+++ b/docs/hands-on/avalanche-ai-handson-demo.pptx
@@ -8,7 +8,6 @@
     <p:sldId id="256" r:id="rId2"/>
     <p:sldId id="257" r:id="rId3"/>
     <p:sldId id="258" r:id="rId4"/>
-    <p:sldId id="259" r:id="rId5"/>
     <p:sldId id="260" r:id="rId6"/>
     <p:sldId id="261" r:id="rId7"/>
     <p:sldId id="262" r:id="rId8"/>
@@ -2588,94 +2587,6 @@
     <p:extLst>
       <p:ext uri="{BB962C8B-B14F-4D97-AF65-F5344CB8AC3E}">
         <p14:creationId xmlns:p14="http://schemas.microsoft.com/office/powerpoint/2010/main" val="1024086992"/>
-      </p:ext>
-    </p:extLst>
-  </p:cSld>
-  <p:clrMapOvr>
-    <a:masterClrMapping/>
-  </p:clrMapOvr>
-</p:notes>
-</file>
-
-<file path=ppt/notesSlides/notesSlide4.xml><?xml version="1.0" encoding="utf-8"?>
-<p:notes xmlns:a="http://schemas.openxmlformats.org/drawingml/2006/main" xmlns:r="http://schemas.openxmlformats.org/officeDocument/2006/relationships" xmlns:p="http://schemas.openxmlformats.org/presentationml/2006/main">
-  <p:cSld>
-    <p:spTree>
-      <p:nvGrpSpPr>
-        <p:cNvPr id="1" name=""/>
-        <p:cNvGrpSpPr/>
-        <p:nvPr/>
-      </p:nvGrpSpPr>
-      <p:grpSpPr>
-        <a:xfrm>
-          <a:off x="0" y="0"/>
-          <a:ext cx="0" cy="0"/>
-          <a:chOff x="0" y="0"/>
-          <a:chExt cx="0" cy="0"/>
-        </a:xfrm>
-      </p:grpSpPr>
-      <p:sp>
-        <p:nvSpPr>
-          <p:cNvPr id="2" name="Slide Image Placeholder 1"/>
-          <p:cNvSpPr>
-            <a:spLocks noGrp="1" noRot="1" noChangeAspect="1"/>
-          </p:cNvSpPr>
-          <p:nvPr>
-            <p:ph type="sldImg"/>
-          </p:nvPr>
-        </p:nvSpPr>
-        <p:spPr/>
-      </p:sp>
-      <p:sp>
-        <p:nvSpPr>
-          <p:cNvPr id="3" name="Notes Placeholder 2"/>
-          <p:cNvSpPr>
-            <a:spLocks noGrp="1"/>
-          </p:cNvSpPr>
-          <p:nvPr>
-            <p:ph type="body" idx="1"/>
-          </p:nvPr>
-        </p:nvSpPr>
-        <p:spPr/>
-        <p:txBody>
-          <a:bodyPr/>
-          <a:lstStyle/>
-          <a:p>
-            <a:r>
-              <a:rPr lang="en-US" dirty="0"/>
-              <a:t/>
-            </a:r>
-            <a:endParaRPr lang="en-US" dirty="0"/>
-          </a:p>
-        </p:txBody>
-      </p:sp>
-      <p:sp>
-        <p:nvSpPr>
-          <p:cNvPr id="4" name="Slide Number Placeholder 3"/>
-          <p:cNvSpPr>
-            <a:spLocks noGrp="1"/>
-          </p:cNvSpPr>
-          <p:nvPr>
-            <p:ph type="sldNum" sz="quarter" idx="10"/>
-          </p:nvPr>
-        </p:nvSpPr>
-        <p:spPr/>
-        <p:txBody>
-          <a:bodyPr/>
-          <a:lstStyle/>
-          <a:p>
-            <a:fld id="{F7021451-1387-4CA6-816F-3879F97B5CBC}" type="slidenum">
-              <a:rPr lang="en-US"/>
-              <a:t>4</a:t>
-            </a:fld>
-            <a:endParaRPr lang="en-US"/>
-          </a:p>
-        </p:txBody>
-      </p:sp>
-    </p:spTree>
-    <p:extLst>
-      <p:ext uri="{BB962C8B-B14F-4D97-AF65-F5344CB8AC3E}">
-        <p14:creationId xmlns:p14="http://schemas.microsoft.com/office/powerpoint/2010/main" val="1024086991"/>
       </p:ext>
     </p:extLst>
   </p:cSld>
@@ -6916,20 +6827,6 @@
             </a:r>
             <a:endParaRPr lang="en-US" sz="1000" dirty="0"/>
           </a:p>
-          <a:p>
-            <a:pPr indent="0" marL="0">
-              <a:buNone/>
-            </a:pPr>
-            <a:r>
-              <a:rPr lang="en-US" sz="1000" dirty="0">
-                <a:solidFill>
-                  <a:srgbClr val="CCCCCC"/>
-                </a:solidFill>
-              </a:rPr>
-              <a:t>• avax-like-frontend-design  →  Avalanche 風デザインの知識</a:t>
-            </a:r>
-            <a:endParaRPr lang="en-US" sz="1000" dirty="0"/>
-          </a:p>
         </p:txBody>
       </p:sp>
     </p:spTree>
@@ -7130,7 +7027,7 @@
                   <a:srgbClr val="F1C40F"/>
                 </a:solidFill>
               </a:rPr>
-              <a:t>💡 Agent Skills オープンスタンダード：Claude Code / Gemini CLI / Cursor 間で互換性あり</a:t>
+              <a:t>💡 スキルは Gemini の Skill-Creator や Claude の /skill-create で相互変換可能</a:t>
             </a:r>
             <a:endParaRPr lang="en-US" sz="1100" dirty="0"/>
           </a:p>
@@ -7166,7 +7063,7 @@
                   <a:srgbClr val="FFFFFF"/>
                 </a:solidFill>
               </a:rPr>
-              <a:t>どのツール向けのスキルでも、他のツールで使用可能！</a:t>
+              <a:t>スキルファイルをダウンロードして変換ツールで利用可能</a:t>
             </a:r>
             <a:endParaRPr lang="en-US" sz="1000" dirty="0"/>
           </a:p>
@@ -8051,46 +7948,6 @@
             </a:r>
             <a:endParaRPr lang="en-US" sz="800" dirty="0"/>
           </a:p>
-          <a:p>
-            <a:pPr indent="0" marL="0">
-              <a:buNone/>
-            </a:pPr>
-            <a:endParaRPr lang="en-US" sz="800" dirty="0"/>
-          </a:p>
-          <a:p>
-            <a:pPr indent="0" marL="0">
-              <a:buNone/>
-            </a:pPr>
-            <a:r>
-              <a:rPr lang="en-US" sz="800" dirty="0">
-                <a:solidFill>
-                  <a:srgbClr val="88FF88"/>
-                </a:solidFill>
-                <a:latin typeface="Courier New" pitchFamily="34" charset="0"/>
-                <a:ea typeface="Courier New" pitchFamily="34" charset="-122"/>
-                <a:cs typeface="Courier New" pitchFamily="34" charset="-120"/>
-              </a:rPr>
-              <a:t># Avalanche デザインスキル</a:t>
-            </a:r>
-            <a:endParaRPr lang="en-US" sz="800" dirty="0"/>
-          </a:p>
-          <a:p>
-            <a:pPr indent="0" marL="0">
-              <a:buNone/>
-            </a:pPr>
-            <a:r>
-              <a:rPr lang="en-US" sz="800" dirty="0">
-                <a:solidFill>
-                  <a:srgbClr val="88FF88"/>
-                </a:solidFill>
-                <a:latin typeface="Courier New" pitchFamily="34" charset="0"/>
-                <a:ea typeface="Courier New" pitchFamily="34" charset="-122"/>
-                <a:cs typeface="Courier New" pitchFamily="34" charset="-120"/>
-              </a:rPr>
-              <a:t>gemini skills install https://github.com/CobaltSato/react-grid-game-rendering-skill/blob/main/avax-like-frontend-design.skill --scope workspace</a:t>
-            </a:r>
-            <a:endParaRPr lang="en-US" sz="800" dirty="0"/>
-          </a:p>
         </p:txBody>
       </p:sp>
       <p:sp>
@@ -14416,150 +14273,6 @@
           </a:p>
         </p:txBody>
       </p:sp>
-      <p:sp>
-        <p:nvSpPr>
-          <p:cNvPr id="19" name="Shape 17"/>
-          <p:cNvSpPr/>
-          <p:nvPr/>
-        </p:nvSpPr>
-        <p:spPr>
-          <a:xfrm>
-            <a:off x="4663440" y="3383280"/>
-            <a:ext cx="4114800" cy="1005840"/>
-          </a:xfrm>
-          <a:prstGeom prst="roundRect">
-            <a:avLst>
-              <a:gd name="adj" fmla="val 9091"/>
-            </a:avLst>
-          </a:prstGeom>
-          <a:solidFill>
-            <a:srgbClr val="DA7756"/>
-          </a:solidFill>
-          <a:ln/>
-        </p:spPr>
-      </p:sp>
-      <p:sp>
-        <p:nvSpPr>
-          <p:cNvPr id="20" name="Text 18"/>
-          <p:cNvSpPr/>
-          <p:nvPr/>
-        </p:nvSpPr>
-        <p:spPr>
-          <a:xfrm>
-            <a:off x="4754880" y="3429000"/>
-            <a:ext cx="3931920" cy="274320"/>
-          </a:xfrm>
-          <a:prstGeom prst="rect">
-            <a:avLst/>
-          </a:prstGeom>
-          <a:noFill/>
-          <a:ln/>
-        </p:spPr>
-        <p:txBody>
-          <a:bodyPr wrap="square" rtlCol="0" anchor="ctr"/>
-          <a:lstStyle/>
-          <a:p>
-            <a:pPr indent="0" marL="0">
-              <a:buNone/>
-            </a:pPr>
-            <a:r>
-              <a:rPr lang="en-US" sz="1000" b="1" dirty="0">
-                <a:solidFill>
-                  <a:srgbClr val="FFFFFF"/>
-                </a:solidFill>
-              </a:rPr>
-              <a:t>🔗 Claude Code を使いたい方へ</a:t>
-            </a:r>
-            <a:endParaRPr lang="en-US" sz="1000" dirty="0"/>
-          </a:p>
-        </p:txBody>
-      </p:sp>
-      <p:sp>
-        <p:nvSpPr>
-          <p:cNvPr id="21" name="Text 19"/>
-          <p:cNvSpPr/>
-          <p:nvPr/>
-        </p:nvSpPr>
-        <p:spPr>
-          <a:xfrm>
-            <a:off x="4754880" y="3657600"/>
-            <a:ext cx="3931920" cy="228600"/>
-          </a:xfrm>
-          <a:prstGeom prst="rect">
-            <a:avLst/>
-          </a:prstGeom>
-          <a:noFill/>
-          <a:ln/>
-        </p:spPr>
-        <p:txBody>
-          <a:bodyPr wrap="square" rtlCol="0" anchor="ctr"/>
-          <a:lstStyle/>
-          <a:p>
-            <a:pPr indent="0" marL="0">
-              <a:buNone/>
-            </a:pPr>
-            <a:r>
-              <a:rPr lang="en-US" sz="900" dirty="0">
-                <a:solidFill>
-                  <a:srgbClr val="FFFFFF"/>
-                </a:solidFill>
-              </a:rPr>
-              <a:t>Claude Code 用の設定が入った PR:</a:t>
-            </a:r>
-            <a:endParaRPr lang="en-US" sz="900" dirty="0"/>
-          </a:p>
-        </p:txBody>
-      </p:sp>
-      <p:sp>
-        <p:nvSpPr>
-          <p:cNvPr id="22" name="Text 20"/>
-          <p:cNvSpPr/>
-          <p:nvPr/>
-        </p:nvSpPr>
-        <p:spPr>
-          <a:xfrm>
-            <a:off x="4754880" y="3886200"/>
-            <a:ext cx="3931920" cy="457200"/>
-          </a:xfrm>
-          <a:prstGeom prst="rect">
-            <a:avLst/>
-          </a:prstGeom>
-          <a:noFill/>
-          <a:ln/>
-        </p:spPr>
-        <p:txBody>
-          <a:bodyPr wrap="square" rtlCol="0" anchor="ctr"/>
-          <a:lstStyle/>
-          <a:p>
-            <a:pPr indent="0" marL="0">
-              <a:buNone/>
-            </a:pPr>
-            <a:r>
-              <a:rPr lang="en-US" sz="800" dirty="0">
-                <a:solidFill>
-                  <a:srgbClr val="FFFFFF"/>
-                </a:solidFill>
-              </a:rPr>
-              <a:t>github.com/CobaltSato/</a:t>
-            </a:r>
-            <a:endParaRPr lang="en-US" sz="800" dirty="0"/>
-          </a:p>
-          <a:p>
-            <a:pPr indent="0" marL="0">
-              <a:buNone/>
-            </a:pPr>
-            <a:r>
-              <a:rPr lang="en-US" sz="800" dirty="0">
-                <a:solidFill>
-                  <a:srgbClr val="FFFFFF"/>
-                </a:solidFill>
-              </a:rPr>
-              <a:t>avalanche-build-games-tool-kit/pull/1</a:t>
-            </a:r>
-            <a:endParaRPr lang="en-US" sz="800" dirty="0"/>
-          </a:p>
-        </p:txBody>
-      </p:sp>
     </p:spTree>
   </p:cSld>
   <p:clrMapOvr>
@@ -14932,7 +14645,7 @@
                   <a:srgbClr val="CCCCCC"/>
                 </a:solidFill>
               </a:rPr>
-              <a:t>Gemini CLI と同じ「AI コーディングアシスタント」カテゴリ。スキルも互換性あり！</a:t>
+              <a:t>Gemini CLI と同じ「AI コーディングアシスタント」カテゴリ</a:t>
             </a:r>
             <a:endParaRPr lang="en-US" sz="1100" dirty="0"/>
           </a:p>
@@ -15364,7 +15077,7 @@
                   <a:srgbClr val="CCCCCC"/>
                 </a:solidFill>
               </a:rPr>
-              <a:t>(Gemini互換)</a:t>
+              <a:t>(変換可能)</a:t>
             </a:r>
             <a:endParaRPr lang="en-US" sz="1000" dirty="0"/>
           </a:p>
@@ -16214,7 +15927,7 @@
                   <a:srgbClr val="CCCCCC"/>
                 </a:solidFill>
               </a:rPr>
-              <a:t>互換性あり ✓</a:t>
+              <a:t>変換可能</a:t>
             </a:r>
             <a:endParaRPr lang="en-US" sz="800" dirty="0"/>
           </a:p>
@@ -17132,7 +16845,7 @@
                   <a:srgbClr val="FFFFFF"/>
                 </a:solidFill>
               </a:rPr>
-              <a:t>💡 スキル（SKILL.md）は Agent Skills オープンスタンダードに準拠、ツール間で共有可能！</a:t>
+              <a:t>💡 スキルは Skill-Creator や /skill-create で相互変換可能</a:t>
             </a:r>
             <a:endParaRPr lang="en-US" sz="1000" dirty="0"/>
           </a:p>
@@ -24743,774 +24456,6 @@
               <a:t>• ボタン: グラスモーフィズム / ネオン効果</a:t>
             </a:r>
             <a:endParaRPr lang="en-US" sz="900" dirty="0"/>
-          </a:p>
-        </p:txBody>
-      </p:sp>
-    </p:spTree>
-  </p:cSld>
-  <p:clrMapOvr>
-    <a:masterClrMapping/>
-  </p:clrMapOvr>
-</p:sld>
-</file>
-
-<file path=ppt/slides/slide4.xml><?xml version="1.0" encoding="utf-8"?>
-<p:sld xmlns:a="http://schemas.openxmlformats.org/drawingml/2006/main" xmlns:r="http://schemas.openxmlformats.org/officeDocument/2006/relationships" xmlns:p="http://schemas.openxmlformats.org/presentationml/2006/main">
-  <p:cSld name="Slide 4">
-    <p:bg>
-      <p:bgPr>
-        <a:solidFill>
-          <a:srgbClr val="1A1A2E"/>
-        </a:solidFill>
-      </p:bgPr>
-    </p:bg>
-    <p:spTree>
-      <p:nvGrpSpPr>
-        <p:cNvPr id="1" name=""/>
-        <p:cNvGrpSpPr/>
-        <p:nvPr/>
-      </p:nvGrpSpPr>
-      <p:grpSpPr>
-        <a:xfrm>
-          <a:off x="0" y="0"/>
-          <a:ext cx="0" cy="0"/>
-          <a:chOff x="0" y="0"/>
-          <a:chExt cx="0" cy="0"/>
-        </a:xfrm>
-      </p:grpSpPr>
-      <p:sp>
-        <p:nvSpPr>
-          <p:cNvPr id="2" name="Shape 0"/>
-          <p:cNvSpPr/>
-          <p:nvPr/>
-        </p:nvSpPr>
-        <p:spPr>
-          <a:xfrm>
-            <a:off x="0" y="0"/>
-            <a:ext cx="9144000" cy="731520"/>
-          </a:xfrm>
-          <a:prstGeom prst="rect">
-            <a:avLst/>
-          </a:prstGeom>
-          <a:solidFill>
-            <a:srgbClr val="E84142"/>
-          </a:solidFill>
-          <a:ln/>
-        </p:spPr>
-      </p:sp>
-      <p:sp>
-        <p:nvSpPr>
-          <p:cNvPr id="3" name="Text 1"/>
-          <p:cNvSpPr/>
-          <p:nvPr/>
-        </p:nvSpPr>
-        <p:spPr>
-          <a:xfrm>
-            <a:off x="457200" y="182880"/>
-            <a:ext cx="8229600" cy="457200"/>
-          </a:xfrm>
-          <a:prstGeom prst="rect">
-            <a:avLst/>
-          </a:prstGeom>
-          <a:noFill/>
-          <a:ln/>
-        </p:spPr>
-        <p:txBody>
-          <a:bodyPr wrap="square" rtlCol="0" anchor="ctr"/>
-          <a:lstStyle/>
-          <a:p>
-            <a:pPr indent="0" marL="0">
-              <a:buNone/>
-            </a:pPr>
-            <a:r>
-              <a:rPr lang="en-US" sz="2800" b="1" dirty="0">
-                <a:solidFill>
-                  <a:srgbClr val="FFFFFF"/>
-                </a:solidFill>
-              </a:rPr>
-              <a:t>Avalanche とは？</a:t>
-            </a:r>
-            <a:endParaRPr lang="en-US" sz="2800" dirty="0"/>
-          </a:p>
-        </p:txBody>
-      </p:sp>
-      <p:sp>
-        <p:nvSpPr>
-          <p:cNvPr id="4" name="Shape 2"/>
-          <p:cNvSpPr/>
-          <p:nvPr/>
-        </p:nvSpPr>
-        <p:spPr>
-          <a:xfrm>
-            <a:off x="365760" y="914400"/>
-            <a:ext cx="8412480" cy="914400"/>
-          </a:xfrm>
-          <a:prstGeom prst="roundRect">
-            <a:avLst>
-              <a:gd name="adj" fmla="val 10000"/>
-            </a:avLst>
-          </a:prstGeom>
-          <a:solidFill>
-            <a:srgbClr val="252540"/>
-          </a:solidFill>
-          <a:ln/>
-        </p:spPr>
-      </p:sp>
-      <p:sp>
-        <p:nvSpPr>
-          <p:cNvPr id="5" name="Text 3"/>
-          <p:cNvSpPr/>
-          <p:nvPr/>
-        </p:nvSpPr>
-        <p:spPr>
-          <a:xfrm>
-            <a:off x="457200" y="1005840"/>
-            <a:ext cx="8229600" cy="365760"/>
-          </a:xfrm>
-          <a:prstGeom prst="rect">
-            <a:avLst/>
-          </a:prstGeom>
-          <a:noFill/>
-          <a:ln/>
-        </p:spPr>
-        <p:txBody>
-          <a:bodyPr wrap="square" rtlCol="0" anchor="ctr"/>
-          <a:lstStyle/>
-          <a:p>
-            <a:pPr algn="ctr" indent="0" marL="0">
-              <a:buNone/>
-            </a:pPr>
-            <a:r>
-              <a:rPr lang="en-US" sz="1800" b="1" dirty="0">
-                <a:solidFill>
-                  <a:srgbClr val="FFFFFF"/>
-                </a:solidFill>
-              </a:rPr>
-              <a:t>高速・低コスト・エコな次世代ブロックチェーン</a:t>
-            </a:r>
-            <a:endParaRPr lang="en-US" sz="1800" dirty="0"/>
-          </a:p>
-        </p:txBody>
-      </p:sp>
-      <p:sp>
-        <p:nvSpPr>
-          <p:cNvPr id="6" name="Text 4"/>
-          <p:cNvSpPr/>
-          <p:nvPr/>
-        </p:nvSpPr>
-        <p:spPr>
-          <a:xfrm>
-            <a:off x="457200" y="1371600"/>
-            <a:ext cx="8229600" cy="320040"/>
-          </a:xfrm>
-          <a:prstGeom prst="rect">
-            <a:avLst/>
-          </a:prstGeom>
-          <a:noFill/>
-          <a:ln/>
-        </p:spPr>
-        <p:txBody>
-          <a:bodyPr wrap="square" rtlCol="0" anchor="ctr"/>
-          <a:lstStyle/>
-          <a:p>
-            <a:pPr algn="ctr" indent="0" marL="0">
-              <a:buNone/>
-            </a:pPr>
-            <a:r>
-              <a:rPr lang="en-US" sz="1200" dirty="0">
-                <a:solidFill>
-                  <a:srgbClr val="CCCCCC"/>
-                </a:solidFill>
-              </a:rPr>
-              <a:t>Ethereum と互換性があり、同じツール（Solidity, ethers.js）が使えます</a:t>
-            </a:r>
-            <a:endParaRPr lang="en-US" sz="1200" dirty="0"/>
-          </a:p>
-        </p:txBody>
-      </p:sp>
-      <p:sp>
-        <p:nvSpPr>
-          <p:cNvPr id="7" name="Text 5"/>
-          <p:cNvSpPr/>
-          <p:nvPr/>
-        </p:nvSpPr>
-        <p:spPr>
-          <a:xfrm>
-            <a:off x="457200" y="2011680"/>
-            <a:ext cx="8229600" cy="365760"/>
-          </a:xfrm>
-          <a:prstGeom prst="rect">
-            <a:avLst/>
-          </a:prstGeom>
-          <a:noFill/>
-          <a:ln/>
-        </p:spPr>
-        <p:txBody>
-          <a:bodyPr wrap="square" rtlCol="0" anchor="ctr"/>
-          <a:lstStyle/>
-          <a:p>
-            <a:pPr indent="0" marL="0">
-              <a:buNone/>
-            </a:pPr>
-            <a:r>
-              <a:rPr lang="en-US" sz="1400" b="1" dirty="0">
-                <a:solidFill>
-                  <a:srgbClr val="16A085"/>
-                </a:solidFill>
-              </a:rPr>
-              <a:t>vs Ethereum</a:t>
-            </a:r>
-            <a:endParaRPr lang="en-US" sz="1400" dirty="0"/>
-          </a:p>
-        </p:txBody>
-      </p:sp>
-      <p:sp>
-        <p:nvSpPr>
-          <p:cNvPr id="8" name="Text 6"/>
-          <p:cNvSpPr/>
-          <p:nvPr/>
-        </p:nvSpPr>
-        <p:spPr>
-          <a:xfrm>
-            <a:off x="457200" y="2468880"/>
-            <a:ext cx="1828800" cy="411480"/>
-          </a:xfrm>
-          <a:prstGeom prst="rect">
-            <a:avLst/>
-          </a:prstGeom>
-          <a:noFill/>
-          <a:ln/>
-        </p:spPr>
-        <p:txBody>
-          <a:bodyPr wrap="square" rtlCol="0" anchor="ctr"/>
-          <a:lstStyle/>
-          <a:p>
-            <a:pPr indent="0" marL="0">
-              <a:buNone/>
-            </a:pPr>
-            <a:r>
-              <a:rPr lang="en-US" sz="1200" dirty="0">
-                <a:solidFill>
-                  <a:srgbClr val="FFFFFF"/>
-                </a:solidFill>
-              </a:rPr>
-              <a:t>処理速度</a:t>
-            </a:r>
-            <a:endParaRPr lang="en-US" sz="1200" dirty="0"/>
-          </a:p>
-        </p:txBody>
-      </p:sp>
-      <p:sp>
-        <p:nvSpPr>
-          <p:cNvPr id="9" name="Shape 7"/>
-          <p:cNvSpPr/>
-          <p:nvPr/>
-        </p:nvSpPr>
-        <p:spPr>
-          <a:xfrm>
-            <a:off x="2377440" y="2468880"/>
-            <a:ext cx="2743200" cy="411480"/>
-          </a:xfrm>
-          <a:prstGeom prst="roundRect">
-            <a:avLst>
-              <a:gd name="adj" fmla="val 11111"/>
-            </a:avLst>
-          </a:prstGeom>
-          <a:solidFill>
-            <a:srgbClr val="333355"/>
-          </a:solidFill>
-          <a:ln/>
-        </p:spPr>
-      </p:sp>
-      <p:sp>
-        <p:nvSpPr>
-          <p:cNvPr id="10" name="Text 8"/>
-          <p:cNvSpPr/>
-          <p:nvPr/>
-        </p:nvSpPr>
-        <p:spPr>
-          <a:xfrm>
-            <a:off x="2377440" y="2468880"/>
-            <a:ext cx="2743200" cy="411480"/>
-          </a:xfrm>
-          <a:prstGeom prst="rect">
-            <a:avLst/>
-          </a:prstGeom>
-          <a:noFill/>
-          <a:ln/>
-        </p:spPr>
-        <p:txBody>
-          <a:bodyPr wrap="square" rtlCol="0" anchor="ctr"/>
-          <a:lstStyle/>
-          <a:p>
-            <a:pPr algn="ctr" indent="0" marL="0">
-              <a:buNone/>
-            </a:pPr>
-            <a:r>
-              <a:rPr lang="en-US" sz="1100" dirty="0">
-                <a:solidFill>
-                  <a:srgbClr val="CCCCCC"/>
-                </a:solidFill>
-              </a:rPr>
-              <a:t>12-15 秒</a:t>
-            </a:r>
-            <a:endParaRPr lang="en-US" sz="1100" dirty="0"/>
-          </a:p>
-        </p:txBody>
-      </p:sp>
-      <p:sp>
-        <p:nvSpPr>
-          <p:cNvPr id="11" name="Shape 9"/>
-          <p:cNvSpPr/>
-          <p:nvPr/>
-        </p:nvSpPr>
-        <p:spPr>
-          <a:xfrm>
-            <a:off x="5303520" y="2468880"/>
-            <a:ext cx="2743200" cy="411480"/>
-          </a:xfrm>
-          <a:prstGeom prst="roundRect">
-            <a:avLst>
-              <a:gd name="adj" fmla="val 11111"/>
-            </a:avLst>
-          </a:prstGeom>
-          <a:solidFill>
-            <a:srgbClr val="E84142"/>
-          </a:solidFill>
-          <a:ln/>
-        </p:spPr>
-      </p:sp>
-      <p:sp>
-        <p:nvSpPr>
-          <p:cNvPr id="12" name="Text 10"/>
-          <p:cNvSpPr/>
-          <p:nvPr/>
-        </p:nvSpPr>
-        <p:spPr>
-          <a:xfrm>
-            <a:off x="5303520" y="2468880"/>
-            <a:ext cx="2743200" cy="411480"/>
-          </a:xfrm>
-          <a:prstGeom prst="rect">
-            <a:avLst/>
-          </a:prstGeom>
-          <a:noFill/>
-          <a:ln/>
-        </p:spPr>
-        <p:txBody>
-          <a:bodyPr wrap="square" rtlCol="0" anchor="ctr"/>
-          <a:lstStyle/>
-          <a:p>
-            <a:pPr algn="ctr" indent="0" marL="0">
-              <a:buNone/>
-            </a:pPr>
-            <a:r>
-              <a:rPr lang="en-US" sz="1100" dirty="0">
-                <a:solidFill>
-                  <a:srgbClr val="FFFFFF"/>
-                </a:solidFill>
-              </a:rPr>
-              <a:t>&lt; 1 秒</a:t>
-            </a:r>
-            <a:endParaRPr lang="en-US" sz="1100" dirty="0"/>
-          </a:p>
-        </p:txBody>
-      </p:sp>
-      <p:sp>
-        <p:nvSpPr>
-          <p:cNvPr id="13" name="Text 11"/>
-          <p:cNvSpPr/>
-          <p:nvPr/>
-        </p:nvSpPr>
-        <p:spPr>
-          <a:xfrm>
-            <a:off x="457200" y="2971800"/>
-            <a:ext cx="1828800" cy="411480"/>
-          </a:xfrm>
-          <a:prstGeom prst="rect">
-            <a:avLst/>
-          </a:prstGeom>
-          <a:noFill/>
-          <a:ln/>
-        </p:spPr>
-        <p:txBody>
-          <a:bodyPr wrap="square" rtlCol="0" anchor="ctr"/>
-          <a:lstStyle/>
-          <a:p>
-            <a:pPr indent="0" marL="0">
-              <a:buNone/>
-            </a:pPr>
-            <a:r>
-              <a:rPr lang="en-US" sz="1200" dirty="0">
-                <a:solidFill>
-                  <a:srgbClr val="FFFFFF"/>
-                </a:solidFill>
-              </a:rPr>
-              <a:t>ガス代</a:t>
-            </a:r>
-            <a:endParaRPr lang="en-US" sz="1200" dirty="0"/>
-          </a:p>
-        </p:txBody>
-      </p:sp>
-      <p:sp>
-        <p:nvSpPr>
-          <p:cNvPr id="14" name="Shape 12"/>
-          <p:cNvSpPr/>
-          <p:nvPr/>
-        </p:nvSpPr>
-        <p:spPr>
-          <a:xfrm>
-            <a:off x="2377440" y="2971800"/>
-            <a:ext cx="2743200" cy="411480"/>
-          </a:xfrm>
-          <a:prstGeom prst="roundRect">
-            <a:avLst>
-              <a:gd name="adj" fmla="val 11111"/>
-            </a:avLst>
-          </a:prstGeom>
-          <a:solidFill>
-            <a:srgbClr val="333355"/>
-          </a:solidFill>
-          <a:ln/>
-        </p:spPr>
-      </p:sp>
-      <p:sp>
-        <p:nvSpPr>
-          <p:cNvPr id="15" name="Text 13"/>
-          <p:cNvSpPr/>
-          <p:nvPr/>
-        </p:nvSpPr>
-        <p:spPr>
-          <a:xfrm>
-            <a:off x="2377440" y="2971800"/>
-            <a:ext cx="2743200" cy="411480"/>
-          </a:xfrm>
-          <a:prstGeom prst="rect">
-            <a:avLst/>
-          </a:prstGeom>
-          <a:noFill/>
-          <a:ln/>
-        </p:spPr>
-        <p:txBody>
-          <a:bodyPr wrap="square" rtlCol="0" anchor="ctr"/>
-          <a:lstStyle/>
-          <a:p>
-            <a:pPr algn="ctr" indent="0" marL="0">
-              <a:buNone/>
-            </a:pPr>
-            <a:r>
-              <a:rPr lang="en-US" sz="1100" dirty="0">
-                <a:solidFill>
-                  <a:srgbClr val="CCCCCC"/>
-                </a:solidFill>
-              </a:rPr>
-              <a:t>高い ($5-50+)</a:t>
-            </a:r>
-            <a:endParaRPr lang="en-US" sz="1100" dirty="0"/>
-          </a:p>
-        </p:txBody>
-      </p:sp>
-      <p:sp>
-        <p:nvSpPr>
-          <p:cNvPr id="16" name="Shape 14"/>
-          <p:cNvSpPr/>
-          <p:nvPr/>
-        </p:nvSpPr>
-        <p:spPr>
-          <a:xfrm>
-            <a:off x="5303520" y="2971800"/>
-            <a:ext cx="2743200" cy="411480"/>
-          </a:xfrm>
-          <a:prstGeom prst="roundRect">
-            <a:avLst>
-              <a:gd name="adj" fmla="val 11111"/>
-            </a:avLst>
-          </a:prstGeom>
-          <a:solidFill>
-            <a:srgbClr val="E84142"/>
-          </a:solidFill>
-          <a:ln/>
-        </p:spPr>
-      </p:sp>
-      <p:sp>
-        <p:nvSpPr>
-          <p:cNvPr id="17" name="Text 15"/>
-          <p:cNvSpPr/>
-          <p:nvPr/>
-        </p:nvSpPr>
-        <p:spPr>
-          <a:xfrm>
-            <a:off x="5303520" y="2971800"/>
-            <a:ext cx="2743200" cy="411480"/>
-          </a:xfrm>
-          <a:prstGeom prst="rect">
-            <a:avLst/>
-          </a:prstGeom>
-          <a:noFill/>
-          <a:ln/>
-        </p:spPr>
-        <p:txBody>
-          <a:bodyPr wrap="square" rtlCol="0" anchor="ctr"/>
-          <a:lstStyle/>
-          <a:p>
-            <a:pPr algn="ctr" indent="0" marL="0">
-              <a:buNone/>
-            </a:pPr>
-            <a:r>
-              <a:rPr lang="en-US" sz="1100" dirty="0">
-                <a:solidFill>
-                  <a:srgbClr val="FFFFFF"/>
-                </a:solidFill>
-              </a:rPr>
-              <a:t>安い ($0.01-0.1)</a:t>
-            </a:r>
-            <a:endParaRPr lang="en-US" sz="1100" dirty="0"/>
-          </a:p>
-        </p:txBody>
-      </p:sp>
-      <p:sp>
-        <p:nvSpPr>
-          <p:cNvPr id="18" name="Text 16"/>
-          <p:cNvSpPr/>
-          <p:nvPr/>
-        </p:nvSpPr>
-        <p:spPr>
-          <a:xfrm>
-            <a:off x="457200" y="3474720"/>
-            <a:ext cx="1828800" cy="411480"/>
-          </a:xfrm>
-          <a:prstGeom prst="rect">
-            <a:avLst/>
-          </a:prstGeom>
-          <a:noFill/>
-          <a:ln/>
-        </p:spPr>
-        <p:txBody>
-          <a:bodyPr wrap="square" rtlCol="0" anchor="ctr"/>
-          <a:lstStyle/>
-          <a:p>
-            <a:pPr indent="0" marL="0">
-              <a:buNone/>
-            </a:pPr>
-            <a:r>
-              <a:rPr lang="en-US" sz="1200" dirty="0">
-                <a:solidFill>
-                  <a:srgbClr val="FFFFFF"/>
-                </a:solidFill>
-              </a:rPr>
-              <a:t>開発ツール</a:t>
-            </a:r>
-            <a:endParaRPr lang="en-US" sz="1200" dirty="0"/>
-          </a:p>
-        </p:txBody>
-      </p:sp>
-      <p:sp>
-        <p:nvSpPr>
-          <p:cNvPr id="19" name="Shape 17"/>
-          <p:cNvSpPr/>
-          <p:nvPr/>
-        </p:nvSpPr>
-        <p:spPr>
-          <a:xfrm>
-            <a:off x="2377440" y="3474720"/>
-            <a:ext cx="2743200" cy="411480"/>
-          </a:xfrm>
-          <a:prstGeom prst="roundRect">
-            <a:avLst>
-              <a:gd name="adj" fmla="val 11111"/>
-            </a:avLst>
-          </a:prstGeom>
-          <a:solidFill>
-            <a:srgbClr val="333355"/>
-          </a:solidFill>
-          <a:ln/>
-        </p:spPr>
-      </p:sp>
-      <p:sp>
-        <p:nvSpPr>
-          <p:cNvPr id="20" name="Text 18"/>
-          <p:cNvSpPr/>
-          <p:nvPr/>
-        </p:nvSpPr>
-        <p:spPr>
-          <a:xfrm>
-            <a:off x="2377440" y="3474720"/>
-            <a:ext cx="2743200" cy="411480"/>
-          </a:xfrm>
-          <a:prstGeom prst="rect">
-            <a:avLst/>
-          </a:prstGeom>
-          <a:noFill/>
-          <a:ln/>
-        </p:spPr>
-        <p:txBody>
-          <a:bodyPr wrap="square" rtlCol="0" anchor="ctr"/>
-          <a:lstStyle/>
-          <a:p>
-            <a:pPr algn="ctr" indent="0" marL="0">
-              <a:buNone/>
-            </a:pPr>
-            <a:r>
-              <a:rPr lang="en-US" sz="1100" dirty="0">
-                <a:solidFill>
-                  <a:srgbClr val="CCCCCC"/>
-                </a:solidFill>
-              </a:rPr>
-              <a:t>Solidity, ethers.js</a:t>
-            </a:r>
-            <a:endParaRPr lang="en-US" sz="1100" dirty="0"/>
-          </a:p>
-        </p:txBody>
-      </p:sp>
-      <p:sp>
-        <p:nvSpPr>
-          <p:cNvPr id="21" name="Shape 19"/>
-          <p:cNvSpPr/>
-          <p:nvPr/>
-        </p:nvSpPr>
-        <p:spPr>
-          <a:xfrm>
-            <a:off x="5303520" y="3474720"/>
-            <a:ext cx="2743200" cy="411480"/>
-          </a:xfrm>
-          <a:prstGeom prst="roundRect">
-            <a:avLst>
-              <a:gd name="adj" fmla="val 11111"/>
-            </a:avLst>
-          </a:prstGeom>
-          <a:solidFill>
-            <a:srgbClr val="E84142"/>
-          </a:solidFill>
-          <a:ln/>
-        </p:spPr>
-      </p:sp>
-      <p:sp>
-        <p:nvSpPr>
-          <p:cNvPr id="22" name="Text 20"/>
-          <p:cNvSpPr/>
-          <p:nvPr/>
-        </p:nvSpPr>
-        <p:spPr>
-          <a:xfrm>
-            <a:off x="5303520" y="3474720"/>
-            <a:ext cx="2743200" cy="411480"/>
-          </a:xfrm>
-          <a:prstGeom prst="rect">
-            <a:avLst/>
-          </a:prstGeom>
-          <a:noFill/>
-          <a:ln/>
-        </p:spPr>
-        <p:txBody>
-          <a:bodyPr wrap="square" rtlCol="0" anchor="ctr"/>
-          <a:lstStyle/>
-          <a:p>
-            <a:pPr algn="ctr" indent="0" marL="0">
-              <a:buNone/>
-            </a:pPr>
-            <a:r>
-              <a:rPr lang="en-US" sz="1100" dirty="0">
-                <a:solidFill>
-                  <a:srgbClr val="FFFFFF"/>
-                </a:solidFill>
-              </a:rPr>
-              <a:t>同じ！</a:t>
-            </a:r>
-            <a:endParaRPr lang="en-US" sz="1100" dirty="0"/>
-          </a:p>
-        </p:txBody>
-      </p:sp>
-      <p:sp>
-        <p:nvSpPr>
-          <p:cNvPr id="23" name="Shape 21"/>
-          <p:cNvSpPr/>
-          <p:nvPr/>
-        </p:nvSpPr>
-        <p:spPr>
-          <a:xfrm>
-            <a:off x="365760" y="4023360"/>
-            <a:ext cx="8412480" cy="731520"/>
-          </a:xfrm>
-          <a:prstGeom prst="roundRect">
-            <a:avLst>
-              <a:gd name="adj" fmla="val 10000"/>
-            </a:avLst>
-          </a:prstGeom>
-          <a:solidFill>
-            <a:srgbClr val="2D4A3E"/>
-          </a:solidFill>
-          <a:ln/>
-        </p:spPr>
-      </p:sp>
-      <p:sp>
-        <p:nvSpPr>
-          <p:cNvPr id="24" name="Text 22"/>
-          <p:cNvSpPr/>
-          <p:nvPr/>
-        </p:nvSpPr>
-        <p:spPr>
-          <a:xfrm>
-            <a:off x="457200" y="4114800"/>
-            <a:ext cx="8229600" cy="320040"/>
-          </a:xfrm>
-          <a:prstGeom prst="rect">
-            <a:avLst/>
-          </a:prstGeom>
-          <a:noFill/>
-          <a:ln/>
-        </p:spPr>
-        <p:txBody>
-          <a:bodyPr wrap="square" rtlCol="0" anchor="ctr"/>
-          <a:lstStyle/>
-          <a:p>
-            <a:pPr algn="ctr" indent="0" marL="0">
-              <a:buNone/>
-            </a:pPr>
-            <a:r>
-              <a:rPr lang="en-US" sz="1300" b="1" dirty="0">
-                <a:solidFill>
-                  <a:srgbClr val="F1C40F"/>
-                </a:solidFill>
-              </a:rPr>
-              <a:t>💡 Fuji テストネット = 無料の練習環境</a:t>
-            </a:r>
-            <a:endParaRPr lang="en-US" sz="1300" dirty="0"/>
-          </a:p>
-        </p:txBody>
-      </p:sp>
-      <p:sp>
-        <p:nvSpPr>
-          <p:cNvPr id="25" name="Text 23"/>
-          <p:cNvSpPr/>
-          <p:nvPr/>
-        </p:nvSpPr>
-        <p:spPr>
-          <a:xfrm>
-            <a:off x="457200" y="4434840"/>
-            <a:ext cx="8229600" cy="274320"/>
-          </a:xfrm>
-          <a:prstGeom prst="rect">
-            <a:avLst/>
-          </a:prstGeom>
-          <a:noFill/>
-          <a:ln/>
-        </p:spPr>
-        <p:txBody>
-          <a:bodyPr wrap="square" rtlCol="0" anchor="ctr"/>
-          <a:lstStyle/>
-          <a:p>
-            <a:pPr algn="ctr" indent="0" marL="0">
-              <a:buNone/>
-            </a:pPr>
-            <a:r>
-              <a:rPr lang="en-US" sz="1100" dirty="0">
-                <a:solidFill>
-                  <a:srgbClr val="CCCCCC"/>
-                </a:solidFill>
-              </a:rPr>
-              <a:t>本番と同じ仕組みで、テスト用 AVAX（無料）を使って開発できます</a:t>
-            </a:r>
-            <a:endParaRPr lang="en-US" sz="1100" dirty="0"/>
           </a:p>
         </p:txBody>
       </p:sp>

</xml_diff>

<commit_message>
Update PowerPoint presentation for Avalanche + AI hands-on demo
- Revised the PowerPoint presentation file to incorporate the latest changes and enhancements, ensuring it aligns with the updated demo documentation.
</commit_message>
<xml_diff>
--- a/docs/hands-on/avalanche-ai-handson-demo.pptx
+++ b/docs/hands-on/avalanche-ai-handson-demo.pptx
@@ -7505,7 +7505,7 @@
                   <a:srgbClr val="DA7756"/>
                 </a:solidFill>
               </a:rPr>
-              <a:t>geminicli.com/extensions/</a:t>
+              <a:t>https://geminicli.com/extensions/</a:t>
             </a:r>
             <a:endParaRPr lang="en-US" sz="1000" dirty="0"/>
           </a:p>
@@ -9760,7 +9760,7 @@
                   <a:srgbClr val="CCCCCC"/>
                 </a:solidFill>
               </a:rPr>
-              <a:t>build.avax.network/</a:t>
+              <a:t>https://build.avax.network/</a:t>
             </a:r>
             <a:endParaRPr lang="en-US" sz="900" dirty="0"/>
           </a:p>
@@ -9924,7 +9924,7 @@
                   <a:srgbClr val="CCCCCC"/>
                 </a:solidFill>
               </a:rPr>
-              <a:t>remix.ethereum.org</a:t>
+              <a:t>https://remix.ethereum.org</a:t>
             </a:r>
             <a:endParaRPr lang="en-US" sz="900" dirty="0"/>
           </a:p>
@@ -14316,7 +14316,7 @@
                   <a:srgbClr val="CCCCCC"/>
                 </a:solidFill>
               </a:rPr>
-              <a:t>core.app/download</a:t>
+              <a:t>https://core.app/download</a:t>
             </a:r>
             <a:endParaRPr lang="en-US" sz="700" dirty="0"/>
           </a:p>
@@ -14388,7 +14388,7 @@
                   <a:srgbClr val="CCCCCC"/>
                 </a:solidFill>
               </a:rPr>
-              <a:t>build.avax.network/console/primary-network/faucet</a:t>
+              <a:t>https://build.avax.network/console/primary-network/faucet</a:t>
             </a:r>
             <a:endParaRPr lang="en-US" sz="700" dirty="0"/>
           </a:p>
@@ -14460,7 +14460,7 @@
                   <a:srgbClr val="CCCCCC"/>
                 </a:solidFill>
               </a:rPr>
-              <a:t>remix.ethereum.org</a:t>
+              <a:t>https://remix.ethereum.org</a:t>
             </a:r>
             <a:endParaRPr lang="en-US" sz="700" dirty="0"/>
           </a:p>
@@ -14532,7 +14532,7 @@
                   <a:srgbClr val="CCCCCC"/>
                 </a:solidFill>
               </a:rPr>
-              <a:t>github.com/google-gemini/gemini-cli</a:t>
+              <a:t>https://github.com/google-gemini/gemini-cli</a:t>
             </a:r>
             <a:endParaRPr lang="en-US" sz="700" dirty="0"/>
           </a:p>
@@ -14604,7 +14604,7 @@
                   <a:srgbClr val="CCCCCC"/>
                 </a:solidFill>
               </a:rPr>
-              <a:t>github.com/CobaltSato/react-grid-game-rendering-skill</a:t>
+              <a:t>https://github.com/CobaltSato/react-grid-game-rendering-skill</a:t>
             </a:r>
             <a:endParaRPr lang="en-US" sz="700" dirty="0"/>
           </a:p>
@@ -14676,7 +14676,7 @@
                   <a:srgbClr val="CCCCCC"/>
                 </a:solidFill>
               </a:rPr>
-              <a:t>cursor.directory (AI プロンプト・ルール集)</a:t>
+              <a:t>https://cursor.directory (AI プロンプト・ルール集)</a:t>
             </a:r>
             <a:endParaRPr lang="en-US" sz="700" dirty="0"/>
           </a:p>
@@ -23014,7 +23014,7 @@
                   <a:srgbClr val="E84142"/>
                 </a:solidFill>
               </a:rPr>
-              <a:t>📎 geminicli.com/extensions/</a:t>
+              <a:t>📎 https://geminicli.com/extensions/</a:t>
             </a:r>
             <a:endParaRPr lang="en-US" sz="900" dirty="0"/>
           </a:p>
@@ -23180,7 +23180,7 @@
                   <a:srgbClr val="E84142"/>
                 </a:solidFill>
               </a:rPr>
-              <a:t>📁 github.com/affaan-m/everything-claude-code</a:t>
+              <a:t>📁 https://github.com/affaan-m/everything-claude-code</a:t>
             </a:r>
             <a:endParaRPr lang="en-US" sz="900" dirty="0"/>
           </a:p>
@@ -23216,7 +23216,7 @@
                   <a:srgbClr val="3498DB"/>
                 </a:solidFill>
               </a:rPr>
-              <a:t>📝 zenn.dev/ttks/articles/a54c7520f827be</a:t>
+              <a:t>📝 https://zenn.dev/ttks/articles/a54c7520f827be</a:t>
             </a:r>
             <a:endParaRPr lang="en-US" sz="900" dirty="0"/>
           </a:p>
@@ -23346,7 +23346,7 @@
                   <a:srgbClr val="E84142"/>
                 </a:solidFill>
               </a:rPr>
-              <a:t>📺 youtube.com/watch?v=QPZCMd5REP8</a:t>
+              <a:t>📺 https://youtube.com/watch?v=QPZCMd5REP8</a:t>
             </a:r>
             <a:endParaRPr lang="en-US" sz="900" dirty="0"/>
           </a:p>
@@ -23382,7 +23382,7 @@
                   <a:srgbClr val="E84142"/>
                 </a:solidFill>
               </a:rPr>
-              <a:t>📁 github.com/chongdashu/phaserjs-oakwoods</a:t>
+              <a:t>📁 https://github.com/chongdashu/phaserjs-oakwoods</a:t>
             </a:r>
             <a:endParaRPr lang="en-US" sz="900" dirty="0"/>
           </a:p>
@@ -23714,7 +23714,7 @@
                   <a:srgbClr val="CCCCCC"/>
                 </a:solidFill>
               </a:rPr>
-              <a:t>github.com/anthropics/claude-code/tree/main/plugins</a:t>
+              <a:t>https://github.com/anthropics/claude-code/tree/main/plugins</a:t>
             </a:r>
             <a:endParaRPr lang="en-US" sz="800" dirty="0"/>
           </a:p>
@@ -23808,7 +23808,7 @@
                   <a:srgbClr val="CCCCCC"/>
                 </a:solidFill>
               </a:rPr>
-              <a:t>cursor.directory/ (Solidity, React 等のベストプラクティス)</a:t>
+              <a:t>https://cursor.directory/ (Solidity, React 等のベストプラクティス)</a:t>
             </a:r>
             <a:endParaRPr lang="en-US" sz="800" dirty="0"/>
           </a:p>
@@ -28617,7 +28617,7 @@
                   <a:srgbClr val="16A085"/>
                 </a:solidFill>
               </a:rPr>
-              <a:t>🔗 github.com/CobaltSato/avalanche-build-games-tool-kit</a:t>
+              <a:t>🔗 https://github.com/CobaltSato/avalanche-build-games-tool-kit</a:t>
             </a:r>
             <a:endParaRPr lang="en-US" sz="1100" dirty="0"/>
           </a:p>

</xml_diff>